<commit_message>
Made some clarifications and adjustments to slides based on student feedback.
Signed-off-by: Burnside <jonathan.burnside@gmail.com>
</commit_message>
<xml_diff>
--- a/Lecture Slides/Extending Linear Regression.pptx
+++ b/Lecture Slides/Extending Linear Regression.pptx
@@ -307,7 +307,7 @@
           <a:p>
             <a:fld id="{F6E6CA7E-AECB-43FE-96AB-CB88CB8FA953}" type="datetimeFigureOut">
               <a:rPr lang="en-US" smtClean="0"/>
-              <a:t>9/29/2016</a:t>
+              <a:t>1/17/2017</a:t>
             </a:fld>
             <a:endParaRPr lang="en-US"/>
           </a:p>
@@ -582,7 +582,7 @@
           <a:p>
             <a:fld id="{F6E6CA7E-AECB-43FE-96AB-CB88CB8FA953}" type="datetimeFigureOut">
               <a:rPr lang="en-US" smtClean="0"/>
-              <a:t>9/29/2016</a:t>
+              <a:t>1/17/2017</a:t>
             </a:fld>
             <a:endParaRPr lang="en-US"/>
           </a:p>
@@ -776,7 +776,7 @@
           <a:p>
             <a:fld id="{F6E6CA7E-AECB-43FE-96AB-CB88CB8FA953}" type="datetimeFigureOut">
               <a:rPr lang="en-US" smtClean="0"/>
-              <a:t>9/29/2016</a:t>
+              <a:t>1/17/2017</a:t>
             </a:fld>
             <a:endParaRPr lang="en-US"/>
           </a:p>
@@ -1044,7 +1044,7 @@
           <a:p>
             <a:fld id="{F6E6CA7E-AECB-43FE-96AB-CB88CB8FA953}" type="datetimeFigureOut">
               <a:rPr lang="en-US" smtClean="0"/>
-              <a:t>9/29/2016</a:t>
+              <a:t>1/17/2017</a:t>
             </a:fld>
             <a:endParaRPr lang="en-US"/>
           </a:p>
@@ -1376,7 +1376,7 @@
           <a:p>
             <a:fld id="{F6E6CA7E-AECB-43FE-96AB-CB88CB8FA953}" type="datetimeFigureOut">
               <a:rPr lang="en-US" smtClean="0"/>
-              <a:t>9/29/2016</a:t>
+              <a:t>1/17/2017</a:t>
             </a:fld>
             <a:endParaRPr lang="en-US"/>
           </a:p>
@@ -1986,7 +1986,7 @@
           <a:p>
             <a:fld id="{F6E6CA7E-AECB-43FE-96AB-CB88CB8FA953}" type="datetimeFigureOut">
               <a:rPr lang="en-US" smtClean="0"/>
-              <a:t>9/29/2016</a:t>
+              <a:t>1/17/2017</a:t>
             </a:fld>
             <a:endParaRPr lang="en-US"/>
           </a:p>
@@ -2833,7 +2833,7 @@
           <a:p>
             <a:fld id="{F6E6CA7E-AECB-43FE-96AB-CB88CB8FA953}" type="datetimeFigureOut">
               <a:rPr lang="en-US" smtClean="0"/>
-              <a:t>9/29/2016</a:t>
+              <a:t>1/17/2017</a:t>
             </a:fld>
             <a:endParaRPr lang="en-US"/>
           </a:p>
@@ -3003,7 +3003,7 @@
           <a:p>
             <a:fld id="{F6E6CA7E-AECB-43FE-96AB-CB88CB8FA953}" type="datetimeFigureOut">
               <a:rPr lang="en-US" smtClean="0"/>
-              <a:t>9/29/2016</a:t>
+              <a:t>1/17/2017</a:t>
             </a:fld>
             <a:endParaRPr lang="en-US"/>
           </a:p>
@@ -3183,7 +3183,7 @@
           <a:p>
             <a:fld id="{F6E6CA7E-AECB-43FE-96AB-CB88CB8FA953}" type="datetimeFigureOut">
               <a:rPr lang="en-US" smtClean="0"/>
-              <a:t>9/29/2016</a:t>
+              <a:t>1/17/2017</a:t>
             </a:fld>
             <a:endParaRPr lang="en-US"/>
           </a:p>
@@ -3353,7 +3353,7 @@
           <a:p>
             <a:fld id="{F6E6CA7E-AECB-43FE-96AB-CB88CB8FA953}" type="datetimeFigureOut">
               <a:rPr lang="en-US" smtClean="0"/>
-              <a:t>9/29/2016</a:t>
+              <a:t>1/17/2017</a:t>
             </a:fld>
             <a:endParaRPr lang="en-US"/>
           </a:p>
@@ -3597,7 +3597,7 @@
           <a:p>
             <a:fld id="{F6E6CA7E-AECB-43FE-96AB-CB88CB8FA953}" type="datetimeFigureOut">
               <a:rPr lang="en-US" smtClean="0"/>
-              <a:t>9/29/2016</a:t>
+              <a:t>1/17/2017</a:t>
             </a:fld>
             <a:endParaRPr lang="en-US"/>
           </a:p>
@@ -3889,7 +3889,7 @@
           <a:p>
             <a:fld id="{F6E6CA7E-AECB-43FE-96AB-CB88CB8FA953}" type="datetimeFigureOut">
               <a:rPr lang="en-US" smtClean="0"/>
-              <a:t>9/29/2016</a:t>
+              <a:t>1/17/2017</a:t>
             </a:fld>
             <a:endParaRPr lang="en-US"/>
           </a:p>
@@ -4327,7 +4327,7 @@
           <a:p>
             <a:fld id="{F6E6CA7E-AECB-43FE-96AB-CB88CB8FA953}" type="datetimeFigureOut">
               <a:rPr lang="en-US" smtClean="0"/>
-              <a:t>9/29/2016</a:t>
+              <a:t>1/17/2017</a:t>
             </a:fld>
             <a:endParaRPr lang="en-US"/>
           </a:p>
@@ -4445,7 +4445,7 @@
           <a:p>
             <a:fld id="{F6E6CA7E-AECB-43FE-96AB-CB88CB8FA953}" type="datetimeFigureOut">
               <a:rPr lang="en-US" smtClean="0"/>
-              <a:t>9/29/2016</a:t>
+              <a:t>1/17/2017</a:t>
             </a:fld>
             <a:endParaRPr lang="en-US"/>
           </a:p>
@@ -4540,7 +4540,7 @@
           <a:p>
             <a:fld id="{F6E6CA7E-AECB-43FE-96AB-CB88CB8FA953}" type="datetimeFigureOut">
               <a:rPr lang="en-US" smtClean="0"/>
-              <a:t>9/29/2016</a:t>
+              <a:t>1/17/2017</a:t>
             </a:fld>
             <a:endParaRPr lang="en-US"/>
           </a:p>
@@ -4819,7 +4819,7 @@
           <a:p>
             <a:fld id="{F6E6CA7E-AECB-43FE-96AB-CB88CB8FA953}" type="datetimeFigureOut">
               <a:rPr lang="en-US" smtClean="0"/>
-              <a:t>9/29/2016</a:t>
+              <a:t>1/17/2017</a:t>
             </a:fld>
             <a:endParaRPr lang="en-US"/>
           </a:p>
@@ -5094,7 +5094,7 @@
           <a:p>
             <a:fld id="{F6E6CA7E-AECB-43FE-96AB-CB88CB8FA953}" type="datetimeFigureOut">
               <a:rPr lang="en-US" smtClean="0"/>
-              <a:t>9/29/2016</a:t>
+              <a:t>1/17/2017</a:t>
             </a:fld>
             <a:endParaRPr lang="en-US"/>
           </a:p>
@@ -5523,7 +5523,7 @@
           <a:p>
             <a:fld id="{F6E6CA7E-AECB-43FE-96AB-CB88CB8FA953}" type="datetimeFigureOut">
               <a:rPr lang="en-US" smtClean="0"/>
-              <a:t>9/29/2016</a:t>
+              <a:t>1/17/2017</a:t>
             </a:fld>
             <a:endParaRPr lang="en-US"/>
           </a:p>
@@ -6117,8 +6117,8 @@
           </a:p>
         </p:txBody>
       </p:sp>
-      <mc:AlternateContent xmlns:mc="http://schemas.openxmlformats.org/markup-compatibility/2006" xmlns:a14="http://schemas.microsoft.com/office/drawing/2010/main">
-        <mc:Choice Requires="a14">
+      <mc:AlternateContent xmlns:mc="http://schemas.openxmlformats.org/markup-compatibility/2006">
+        <mc:Choice xmlns:a14="http://schemas.microsoft.com/office/drawing/2010/main" Requires="a14">
           <p:sp>
             <p:nvSpPr>
               <p:cNvPr id="3" name="Content Placeholder 2"/>
@@ -6138,7 +6138,7 @@
               <a:p>
                 <a:r>
                   <a:rPr lang="en-US" dirty="0"/>
-                  <a:t>When using multiple features, and polynomial features, we are likely to have features that have a high impact on our results based on their numeric range, instead of their actual impact on the results.</a:t>
+                  <a:t>When using multiple data points, and polynomial features, we are likely to have data points that have a high impact on our results based on their numeric range, instead of their actual impact on the results.</a:t>
                 </a:r>
               </a:p>
               <a:p>
@@ -6197,7 +6197,7 @@
                 </a14:m>
                 <a:r>
                   <a:rPr lang="en-US" dirty="0"/>
-                  <a:t> is going to be much larger.</a:t>
+                  <a:t> is going to be much larger or smaller.</a:t>
                 </a:r>
               </a:p>
               <a:p>
@@ -6215,7 +6215,7 @@
             </p:txBody>
           </p:sp>
         </mc:Choice>
-        <mc:Fallback xmlns="">
+        <mc:Fallback>
           <p:sp>
             <p:nvSpPr>
               <p:cNvPr id="3" name="Content Placeholder 2"/>
@@ -6230,7 +6230,7 @@
               <a:blipFill>
                 <a:blip r:embed="rId2"/>
                 <a:stretch>
-                  <a:fillRect l="-341" t="-1599" r="-272"/>
+                  <a:fillRect l="-341" t="-1599" r="-341" b="-1890"/>
                 </a:stretch>
               </a:blipFill>
             </p:spPr>
@@ -6301,8 +6301,8 @@
           </a:p>
         </p:txBody>
       </p:sp>
-      <mc:AlternateContent xmlns:mc="http://schemas.openxmlformats.org/markup-compatibility/2006" xmlns:a14="http://schemas.microsoft.com/office/drawing/2010/main">
-        <mc:Choice Requires="a14">
+      <mc:AlternateContent xmlns:mc="http://schemas.openxmlformats.org/markup-compatibility/2006">
+        <mc:Choice xmlns:a14="http://schemas.microsoft.com/office/drawing/2010/main" Requires="a14">
           <p:sp>
             <p:nvSpPr>
               <p:cNvPr id="3" name="Content Placeholder 2"/>
@@ -6315,12 +6315,14 @@
             </p:nvSpPr>
             <p:spPr/>
             <p:txBody>
-              <a:bodyPr/>
+              <a:bodyPr>
+                <a:normAutofit lnSpcReduction="10000"/>
+              </a:bodyPr>
               <a:lstStyle/>
               <a:p>
                 <a:r>
                   <a:rPr lang="en-US" dirty="0"/>
-                  <a:t>To get the best results possible, we will often have to use a large data set, with a high number of features and polynomial features.</a:t>
+                  <a:t>To get the best results possible, we will often have to use a large data set, with a high number of data points per feature and polynomial features.</a:t>
                 </a:r>
               </a:p>
               <a:p>
@@ -7078,7 +7080,7 @@
                       <a:schemeClr val="tx1"/>
                     </a:solidFill>
                   </a:rPr>
-                  <a:t> is row major matrix where each row represents the features of one example from our training data.</a:t>
+                  <a:t> is row major matrix where each row represents the data points of one feature from our training data.</a:t>
                 </a:r>
               </a:p>
               <a:p>
@@ -7087,7 +7089,7 @@
             </p:txBody>
           </p:sp>
         </mc:Choice>
-        <mc:Fallback xmlns="">
+        <mc:Fallback>
           <p:sp>
             <p:nvSpPr>
               <p:cNvPr id="3" name="Content Placeholder 2"/>
@@ -7102,7 +7104,7 @@
               <a:blipFill>
                 <a:blip r:embed="rId2"/>
                 <a:stretch>
-                  <a:fillRect l="-341" t="-872" r="-1226"/>
+                  <a:fillRect l="-341" t="-1599" r="-1226"/>
                 </a:stretch>
               </a:blipFill>
             </p:spPr>
@@ -7844,8 +7846,8 @@
           </a:p>
         </p:txBody>
       </p:sp>
-      <mc:AlternateContent xmlns:mc="http://schemas.openxmlformats.org/markup-compatibility/2006" xmlns:a14="http://schemas.microsoft.com/office/drawing/2010/main">
-        <mc:Choice Requires="a14">
+      <mc:AlternateContent xmlns:mc="http://schemas.openxmlformats.org/markup-compatibility/2006">
+        <mc:Choice xmlns:a14="http://schemas.microsoft.com/office/drawing/2010/main" Requires="a14">
           <p:sp>
             <p:nvSpPr>
               <p:cNvPr id="3" name="Content Placeholder 2"/>
@@ -7858,8 +7860,8 @@
             </p:nvSpPr>
             <p:spPr>
               <a:xfrm>
-                <a:off x="648931" y="2438400"/>
-                <a:ext cx="4796523" cy="3785419"/>
+                <a:off x="303155" y="2404844"/>
+                <a:ext cx="5139473" cy="3785419"/>
               </a:xfrm>
             </p:spPr>
             <p:txBody>
@@ -8202,6 +8204,12 @@
                     </m:r>
                   </m:oMath>
                 </a14:m>
+                <a:br>
+                  <a:rPr lang="en-US" dirty="0"/>
+                </a:br>
+                <a:br>
+                  <a:rPr lang="en-US" dirty="0"/>
+                </a:br>
                 <a:r>
                   <a:rPr lang="en-US" dirty="0"/>
                   <a:t>becomes:</a:t>
@@ -8511,7 +8519,7 @@
             </p:txBody>
           </p:sp>
         </mc:Choice>
-        <mc:Fallback xmlns="">
+        <mc:Fallback>
           <p:sp>
             <p:nvSpPr>
               <p:cNvPr id="3" name="Content Placeholder 2"/>
@@ -8524,13 +8532,13 @@
             </p:nvSpPr>
             <p:spPr>
               <a:xfrm>
-                <a:off x="648931" y="2438400"/>
-                <a:ext cx="4796523" cy="3785419"/>
+                <a:off x="303155" y="2404844"/>
+                <a:ext cx="5139473" cy="3785419"/>
               </a:xfrm>
               <a:blipFill>
                 <a:blip r:embed="rId3"/>
                 <a:stretch>
-                  <a:fillRect l="-508" t="-5797"/>
+                  <a:fillRect l="-593" t="-1610"/>
                 </a:stretch>
               </a:blipFill>
             </p:spPr>
@@ -14265,8 +14273,8 @@
           </a:p>
         </p:txBody>
       </p:sp>
-      <mc:AlternateContent xmlns:mc="http://schemas.openxmlformats.org/markup-compatibility/2006">
-        <mc:Choice xmlns:a14="http://schemas.microsoft.com/office/drawing/2010/main" Requires="a14">
+      <mc:AlternateContent xmlns:mc="http://schemas.openxmlformats.org/markup-compatibility/2006" xmlns:a14="http://schemas.microsoft.com/office/drawing/2010/main">
+        <mc:Choice Requires="a14">
           <p:sp>
             <p:nvSpPr>
               <p:cNvPr id="3" name="Content Placeholder 2"/>
@@ -15249,7 +15257,7 @@
             </p:txBody>
           </p:sp>
         </mc:Choice>
-        <mc:Fallback>
+        <mc:Fallback xmlns="">
           <p:sp>
             <p:nvSpPr>
               <p:cNvPr id="3" name="Content Placeholder 2"/>
@@ -15504,8 +15512,8 @@
           </a:p>
         </p:txBody>
       </p:sp>
-      <mc:AlternateContent xmlns:mc="http://schemas.openxmlformats.org/markup-compatibility/2006" xmlns:a14="http://schemas.microsoft.com/office/drawing/2010/main">
-        <mc:Choice Requires="a14">
+      <mc:AlternateContent xmlns:mc="http://schemas.openxmlformats.org/markup-compatibility/2006">
+        <mc:Choice xmlns:a14="http://schemas.microsoft.com/office/drawing/2010/main" Requires="a14">
           <p:sp>
             <p:nvSpPr>
               <p:cNvPr id="3" name="Content Placeholder 2"/>
@@ -15523,20 +15531,20 @@
               <a:p>
                 <a:r>
                   <a:rPr lang="en-US" dirty="0"/>
-                  <a:t>Most interesting predictions will need to be made based on more than just one input feature, even a polynomial one.</a:t>
+                  <a:t>Most interesting predictions will need to be made based on more than just one data point per feature, even a polynomial one.</a:t>
                 </a:r>
               </a:p>
               <a:p>
                 <a:pPr lvl="1"/>
                 <a:r>
                   <a:rPr lang="en-US" dirty="0"/>
-                  <a:t>We likely cannot get a very good universal prediction of house sales based only on square footage. We would likely need additional features such as the number of rooms, fitness of location, number of floors, etc.</a:t>
+                  <a:t>We likely cannot get a very good universal prediction of house sales based only on square footage. We would likely need additional data points such as the number of rooms, fitness of location, number of floors, etc. to make up our features.</a:t>
                 </a:r>
               </a:p>
               <a:p>
                 <a:r>
                   <a:rPr lang="en-US" dirty="0"/>
-                  <a:t>We can add additional features to our heuristic in much the same way we added polynomial features:</a:t>
+                  <a:t>We can add additional data points to our heuristic in much the same way we added polynomial features:</a:t>
                 </a:r>
               </a:p>
               <a:p>
@@ -16216,13 +16224,39 @@
                 </a14:m>
                 <a:r>
                   <a:rPr lang="en-US" dirty="0"/>
-                  <a:t> are different features we care about.</a:t>
+                  <a:t> are different data points in the given feature</a:t>
                 </a:r>
+                <a14:m>
+                  <m:oMath xmlns:m="http://schemas.openxmlformats.org/officeDocument/2006/math">
+                    <m:r>
+                      <a:rPr lang="en-US" b="0" i="0" smtClean="0">
+                        <a:latin typeface="Cambria Math" panose="02040503050406030204" pitchFamily="18" charset="0"/>
+                        <a:ea typeface="Cambria Math" panose="02040503050406030204" pitchFamily="18" charset="0"/>
+                      </a:rPr>
+                      <m:t> </m:t>
+                    </m:r>
+                    <m:r>
+                      <a:rPr lang="en-US" i="1">
+                        <a:latin typeface="Cambria Math" panose="02040503050406030204" pitchFamily="18" charset="0"/>
+                        <a:ea typeface="Cambria Math" panose="02040503050406030204" pitchFamily="18" charset="0"/>
+                      </a:rPr>
+                      <m:t>𝑥</m:t>
+                    </m:r>
+                    <m:r>
+                      <a:rPr lang="en-US" b="0" i="1" smtClean="0">
+                        <a:latin typeface="Cambria Math" panose="02040503050406030204" pitchFamily="18" charset="0"/>
+                        <a:ea typeface="Cambria Math" panose="02040503050406030204" pitchFamily="18" charset="0"/>
+                      </a:rPr>
+                      <m:t>.</m:t>
+                    </m:r>
+                  </m:oMath>
+                </a14:m>
+                <a:endParaRPr lang="en-US" dirty="0"/>
               </a:p>
             </p:txBody>
           </p:sp>
         </mc:Choice>
-        <mc:Fallback xmlns="">
+        <mc:Fallback>
           <p:sp>
             <p:nvSpPr>
               <p:cNvPr id="3" name="Content Placeholder 2"/>
@@ -16237,7 +16271,7 @@
               <a:blipFill>
                 <a:blip r:embed="rId2"/>
                 <a:stretch>
-                  <a:fillRect l="-341" t="-872" r="-1022"/>
+                  <a:fillRect l="-341" t="-872" r="-409"/>
                 </a:stretch>
               </a:blipFill>
             </p:spPr>

</xml_diff>